<commit_message>
Modified 12 Factor PPT
</commit_message>
<xml_diff>
--- a/12 Factor/TwelveFactorApp.pptx
+++ b/12 Factor/TwelveFactorApp.pptx
@@ -3560,7 +3560,7 @@
           <a:p>
             <a:fld id="{48A87A34-81AB-432B-8DAE-1953F412C126}" type="datetimeFigureOut">
               <a:rPr lang="en-US" smtClean="0"/>
-              <a:t>1/10/2020</a:t>
+              <a:t>1/29/2020</a:t>
             </a:fld>
             <a:endParaRPr lang="en-US" dirty="0"/>
           </a:p>
@@ -3852,7 +3852,7 @@
             <a:fld id="{48A87A34-81AB-432B-8DAE-1953F412C126}" type="datetimeFigureOut">
               <a:rPr lang="en-US" smtClean="0"/>
               <a:pPr/>
-              <a:t>1/10/2020</a:t>
+              <a:t>1/29/2020</a:t>
             </a:fld>
             <a:endParaRPr lang="en-US" dirty="0"/>
           </a:p>
@@ -4113,7 +4113,7 @@
             <a:fld id="{48A87A34-81AB-432B-8DAE-1953F412C126}" type="datetimeFigureOut">
               <a:rPr lang="en-US" smtClean="0"/>
               <a:pPr/>
-              <a:t>1/10/2020</a:t>
+              <a:t>1/29/2020</a:t>
             </a:fld>
             <a:endParaRPr lang="en-US" dirty="0"/>
           </a:p>
@@ -4584,7 +4584,7 @@
             <a:fld id="{48A87A34-81AB-432B-8DAE-1953F412C126}" type="datetimeFigureOut">
               <a:rPr lang="en-US" smtClean="0"/>
               <a:pPr/>
-              <a:t>1/10/2020</a:t>
+              <a:t>1/29/2020</a:t>
             </a:fld>
             <a:endParaRPr lang="en-US" dirty="0"/>
           </a:p>
@@ -4766,7 +4766,7 @@
             <a:fld id="{48A87A34-81AB-432B-8DAE-1953F412C126}" type="datetimeFigureOut">
               <a:rPr lang="en-US" smtClean="0"/>
               <a:pPr/>
-              <a:t>1/10/2020</a:t>
+              <a:t>1/29/2020</a:t>
             </a:fld>
             <a:endParaRPr lang="en-US" dirty="0"/>
           </a:p>
@@ -5344,7 +5344,7 @@
             <a:fld id="{48A87A34-81AB-432B-8DAE-1953F412C126}" type="datetimeFigureOut">
               <a:rPr lang="en-US" smtClean="0"/>
               <a:pPr/>
-              <a:t>1/10/2020</a:t>
+              <a:t>1/29/2020</a:t>
             </a:fld>
             <a:endParaRPr lang="en-US" dirty="0"/>
           </a:p>
@@ -5678,7 +5678,7 @@
             <a:fld id="{48A87A34-81AB-432B-8DAE-1953F412C126}" type="datetimeFigureOut">
               <a:rPr lang="en-US" smtClean="0"/>
               <a:pPr/>
-              <a:t>1/10/2020</a:t>
+              <a:t>1/29/2020</a:t>
             </a:fld>
             <a:endParaRPr lang="en-US" dirty="0"/>
           </a:p>
@@ -5854,7 +5854,7 @@
           <a:p>
             <a:fld id="{48A87A34-81AB-432B-8DAE-1953F412C126}" type="datetimeFigureOut">
               <a:rPr lang="en-US" smtClean="0"/>
-              <a:t>1/10/2020</a:t>
+              <a:t>1/29/2020</a:t>
             </a:fld>
             <a:endParaRPr lang="en-US" dirty="0"/>
           </a:p>
@@ -6034,7 +6034,7 @@
           <a:p>
             <a:fld id="{48A87A34-81AB-432B-8DAE-1953F412C126}" type="datetimeFigureOut">
               <a:rPr lang="en-US" smtClean="0"/>
-              <a:t>1/10/2020</a:t>
+              <a:t>1/29/2020</a:t>
             </a:fld>
             <a:endParaRPr lang="en-US" dirty="0"/>
           </a:p>
@@ -6204,7 +6204,7 @@
           <a:p>
             <a:fld id="{48A87A34-81AB-432B-8DAE-1953F412C126}" type="datetimeFigureOut">
               <a:rPr lang="en-US" smtClean="0"/>
-              <a:t>1/10/2020</a:t>
+              <a:t>1/29/2020</a:t>
             </a:fld>
             <a:endParaRPr lang="en-US" dirty="0"/>
           </a:p>
@@ -6461,7 +6461,7 @@
           <a:p>
             <a:fld id="{48A87A34-81AB-432B-8DAE-1953F412C126}" type="datetimeFigureOut">
               <a:rPr lang="en-US" smtClean="0"/>
-              <a:t>1/10/2020</a:t>
+              <a:t>1/29/2020</a:t>
             </a:fld>
             <a:endParaRPr lang="en-US" dirty="0"/>
           </a:p>
@@ -6753,7 +6753,7 @@
           <a:p>
             <a:fld id="{48A87A34-81AB-432B-8DAE-1953F412C126}" type="datetimeFigureOut">
               <a:rPr lang="en-US" smtClean="0"/>
-              <a:t>1/10/2020</a:t>
+              <a:t>1/29/2020</a:t>
             </a:fld>
             <a:endParaRPr lang="en-US" dirty="0"/>
           </a:p>
@@ -7183,7 +7183,7 @@
           <a:p>
             <a:fld id="{48A87A34-81AB-432B-8DAE-1953F412C126}" type="datetimeFigureOut">
               <a:rPr lang="en-US" smtClean="0"/>
-              <a:t>1/10/2020</a:t>
+              <a:t>1/29/2020</a:t>
             </a:fld>
             <a:endParaRPr lang="en-US" dirty="0"/>
           </a:p>
@@ -7301,7 +7301,7 @@
           <a:p>
             <a:fld id="{48A87A34-81AB-432B-8DAE-1953F412C126}" type="datetimeFigureOut">
               <a:rPr lang="en-US" smtClean="0"/>
-              <a:t>1/10/2020</a:t>
+              <a:t>1/29/2020</a:t>
             </a:fld>
             <a:endParaRPr lang="en-US" dirty="0"/>
           </a:p>
@@ -7396,7 +7396,7 @@
           <a:p>
             <a:fld id="{48A87A34-81AB-432B-8DAE-1953F412C126}" type="datetimeFigureOut">
               <a:rPr lang="en-US" smtClean="0"/>
-              <a:t>1/10/2020</a:t>
+              <a:t>1/29/2020</a:t>
             </a:fld>
             <a:endParaRPr lang="en-US" dirty="0"/>
           </a:p>
@@ -7679,7 +7679,7 @@
           <a:p>
             <a:fld id="{48A87A34-81AB-432B-8DAE-1953F412C126}" type="datetimeFigureOut">
               <a:rPr lang="en-US" smtClean="0"/>
-              <a:t>1/10/2020</a:t>
+              <a:t>1/29/2020</a:t>
             </a:fld>
             <a:endParaRPr lang="en-US" dirty="0"/>
           </a:p>
@@ -7970,7 +7970,7 @@
           <a:p>
             <a:fld id="{48A87A34-81AB-432B-8DAE-1953F412C126}" type="datetimeFigureOut">
               <a:rPr lang="en-US" smtClean="0"/>
-              <a:t>1/10/2020</a:t>
+              <a:t>1/29/2020</a:t>
             </a:fld>
             <a:endParaRPr lang="en-US" dirty="0"/>
           </a:p>
@@ -8202,7 +8202,7 @@
             <a:fld id="{48A87A34-81AB-432B-8DAE-1953F412C126}" type="datetimeFigureOut">
               <a:rPr lang="en-US" smtClean="0"/>
               <a:pPr/>
-              <a:t>1/10/2020</a:t>
+              <a:t>1/29/2020</a:t>
             </a:fld>
             <a:endParaRPr lang="en-US" dirty="0"/>
           </a:p>
@@ -8975,7 +8975,6 @@
                 <a:lumMod val="114000"/>
               </a:schemeClr>
             </a:duotone>
-            <a:extLst/>
           </a:blip>
           <a:stretch/>
         </a:blipFill>
@@ -9043,7 +9042,7 @@
                 <a:latin typeface="Times New Roman" panose="02020603050405020304" pitchFamily="18" charset="0"/>
                 <a:cs typeface="Times New Roman" panose="02020603050405020304" pitchFamily="18" charset="0"/>
               </a:rPr>
-              <a:t> app METHODOLOGY</a:t>
+              <a:t> app METHODOLOGIES</a:t>
             </a:r>
             <a:endParaRPr lang="en-IN" sz="6600" dirty="0">
               <a:latin typeface="Times New Roman" panose="02020603050405020304" pitchFamily="18" charset="0"/>
@@ -9085,7 +9084,6 @@
                 <a:lumMod val="114000"/>
               </a:schemeClr>
             </a:duotone>
-            <a:extLst/>
           </a:blip>
           <a:stretch/>
         </a:blipFill>
@@ -9318,7 +9316,6 @@
                 <a:lumMod val="114000"/>
               </a:schemeClr>
             </a:duotone>
-            <a:extLst/>
           </a:blip>
           <a:stretch/>
         </a:blipFill>
@@ -9560,7 +9557,6 @@
                 <a:lumMod val="114000"/>
               </a:schemeClr>
             </a:duotone>
-            <a:extLst/>
           </a:blip>
           <a:stretch/>
         </a:blipFill>
@@ -9789,7 +9785,6 @@
                 <a:lumMod val="114000"/>
               </a:schemeClr>
             </a:duotone>
-            <a:extLst/>
           </a:blip>
           <a:stretch/>
         </a:blipFill>
@@ -10018,7 +10013,6 @@
                 <a:lumMod val="114000"/>
               </a:schemeClr>
             </a:duotone>
-            <a:extLst/>
           </a:blip>
           <a:stretch/>
         </a:blipFill>
@@ -10252,7 +10246,6 @@
                 <a:lumMod val="114000"/>
               </a:schemeClr>
             </a:duotone>
-            <a:extLst/>
           </a:blip>
           <a:stretch/>
         </a:blipFill>
@@ -10492,7 +10485,6 @@
                 <a:lumMod val="114000"/>
               </a:schemeClr>
             </a:duotone>
-            <a:extLst/>
           </a:blip>
           <a:stretch/>
         </a:blipFill>
@@ -11442,7 +11434,6 @@
                 <a:lumMod val="114000"/>
               </a:schemeClr>
             </a:duotone>
-            <a:extLst/>
           </a:blip>
           <a:stretch/>
         </a:blipFill>
@@ -11509,7 +11500,7 @@
                   </a:outerShdw>
                 </a:effectLst>
               </a:rPr>
-              <a:t>THANK YOU!!</a:t>
+              <a:t>THANK YOU!!!</a:t>
             </a:r>
           </a:p>
         </p:txBody>
@@ -11611,7 +11602,6 @@
                 <a:lumMod val="114000"/>
               </a:schemeClr>
             </a:duotone>
-            <a:extLst/>
           </a:blip>
           <a:stretch/>
         </a:blipFill>
@@ -11757,7 +11747,6 @@
                 <a:lumMod val="114000"/>
               </a:schemeClr>
             </a:duotone>
-            <a:extLst/>
           </a:blip>
           <a:stretch/>
         </a:blipFill>
@@ -11808,9 +11797,9 @@
           <a:p>
             <a:r>
               <a:rPr lang="en-US" sz="3600"/>
-              <a:t>GOALS of 12 factor app</a:t>
-            </a:r>
-            <a:endParaRPr lang="en-IN" sz="3600"/>
+              <a:t>GOAL of 12 factor app</a:t>
+            </a:r>
+            <a:endParaRPr lang="en-IN" sz="3600" dirty="0"/>
           </a:p>
         </p:txBody>
       </p:sp>
@@ -11878,7 +11867,6 @@
                 <a:lumMod val="114000"/>
               </a:schemeClr>
             </a:duotone>
-            <a:extLst/>
           </a:blip>
           <a:stretch/>
         </a:blipFill>
@@ -12040,7 +12028,6 @@
                 <a:lumMod val="114000"/>
               </a:schemeClr>
             </a:duotone>
-            <a:extLst/>
           </a:blip>
           <a:stretch/>
         </a:blipFill>
@@ -12250,7 +12237,6 @@
                 <a:lumMod val="114000"/>
               </a:schemeClr>
             </a:duotone>
-            <a:extLst/>
           </a:blip>
           <a:stretch/>
         </a:blipFill>
@@ -12488,7 +12474,6 @@
                 <a:lumMod val="114000"/>
               </a:schemeClr>
             </a:duotone>
-            <a:extLst/>
           </a:blip>
           <a:stretch/>
         </a:blipFill>
@@ -12736,7 +12721,6 @@
                 <a:lumMod val="114000"/>
               </a:schemeClr>
             </a:duotone>
-            <a:extLst/>
           </a:blip>
           <a:stretch/>
         </a:blipFill>
@@ -12981,7 +12965,6 @@
                 <a:lumMod val="114000"/>
               </a:schemeClr>
             </a:duotone>
-            <a:extLst/>
           </a:blip>
           <a:stretch/>
         </a:blipFill>

</xml_diff>